<commit_message>
Uploaded my latest CV file, which includes updated professional experience, education, and skills.
"This commit includes the latest version of my CV. The document has been updated with the following changes:
- Added recent professional experience from the past two years.
- Updated education section to reflect new qualifications.
- Included additional technical skills acquired recently.
- Reformatted the layout for improved readability and design consistency.

This file is intended for job applications and showcases my most recent accomplishments and skills."
</commit_message>
<xml_diff>
--- a/CV.pptx
+++ b/CV.pptx
@@ -273,7 +273,7 @@
           <a:p>
             <a:fld id="{1D8BD707-D9CF-40AE-B4C6-C98DA3205C09}" type="datetimeFigureOut">
               <a:rPr lang="en-US"/>
-              <a:t>26-Nov-24</a:t>
+              <a:t>08-Dec-24</a:t>
             </a:fld>
             <a:endParaRPr lang="en-US"/>
           </a:p>
@@ -438,7 +438,7 @@
           <a:p>
             <a:fld id="{1D8BD707-D9CF-40AE-B4C6-C98DA3205C09}" type="datetimeFigureOut">
               <a:rPr lang="en-US"/>
-              <a:t>26-Nov-24</a:t>
+              <a:t>08-Dec-24</a:t>
             </a:fld>
             <a:endParaRPr lang="en-US"/>
           </a:p>
@@ -646,7 +646,7 @@
           <a:p>
             <a:fld id="{1D8BD707-D9CF-40AE-B4C6-C98DA3205C09}" type="datetimeFigureOut">
               <a:rPr lang="en-US"/>
-              <a:t>26-Nov-24</a:t>
+              <a:t>08-Dec-24</a:t>
             </a:fld>
             <a:endParaRPr lang="en-US"/>
           </a:p>
@@ -788,7 +788,7 @@
           <a:p>
             <a:fld id="{1D8BD707-D9CF-40AE-B4C6-C98DA3205C09}" type="datetimeFigureOut">
               <a:rPr lang="en-US"/>
-              <a:t>26-Nov-24</a:t>
+              <a:t>08-Dec-24</a:t>
             </a:fld>
             <a:endParaRPr lang="en-US"/>
           </a:p>
@@ -907,7 +907,7 @@
           <a:p>
             <a:fld id="{1D8BD707-D9CF-40AE-B4C6-C98DA3205C09}" type="datetimeFigureOut">
               <a:rPr lang="en-US"/>
-              <a:t>26-Nov-24</a:t>
+              <a:t>08-Dec-24</a:t>
             </a:fld>
             <a:endParaRPr lang="en-US"/>
           </a:p>
@@ -1120,7 +1120,7 @@
           <a:p>
             <a:fld id="{1D8BD707-D9CF-40AE-B4C6-C98DA3205C09}" type="datetimeFigureOut">
               <a:rPr lang="en-US"/>
-              <a:t>26-Nov-24</a:t>
+              <a:t>08-Dec-24</a:t>
             </a:fld>
             <a:endParaRPr lang="en-US"/>
           </a:p>
@@ -1768,52 +1768,6 @@
       </p:sp>
       <p:sp>
         <p:nvSpPr>
-          <p:cNvPr id="10" name="object 10"/>
-          <p:cNvSpPr txBox="1"/>
-          <p:nvPr/>
-        </p:nvSpPr>
-        <p:spPr>
-          <a:xfrm>
-            <a:off x="2410433" y="5867091"/>
-            <a:ext cx="970280" cy="228909"/>
-          </a:xfrm>
-          <a:prstGeom prst="rect">
-            <a:avLst/>
-          </a:prstGeom>
-        </p:spPr>
-        <p:txBody>
-          <a:bodyPr vert="horz" wrap="square" lIns="0" tIns="13335" rIns="0" bIns="0" rtlCol="0">
-            <a:spAutoFit/>
-          </a:bodyPr>
-          <a:lstStyle/>
-          <a:p>
-            <a:pPr marL="12700">
-              <a:lnSpc>
-                <a:spcPct val="100000"/>
-              </a:lnSpc>
-              <a:spcBef>
-                <a:spcPts val="105"/>
-              </a:spcBef>
-            </a:pPr>
-            <a:r>
-              <a:rPr lang="en-US" sz="1400" b="1" spc="-5" dirty="0" smtClean="0">
-                <a:solidFill>
-                  <a:srgbClr val="2D74B5"/>
-                </a:solidFill>
-                <a:latin typeface="Calibri"/>
-                <a:cs typeface="Calibri"/>
-              </a:rPr>
-              <a:t>Project</a:t>
-            </a:r>
-            <a:endParaRPr sz="1400" dirty="0">
-              <a:latin typeface="Calibri"/>
-              <a:cs typeface="Calibri"/>
-            </a:endParaRPr>
-          </a:p>
-        </p:txBody>
-      </p:sp>
-      <p:sp>
-        <p:nvSpPr>
           <p:cNvPr id="11" name="object 11"/>
           <p:cNvSpPr txBox="1"/>
           <p:nvPr/>
@@ -2711,14 +2665,14 @@
           <p:nvPr>
             <p:extLst>
               <p:ext uri="{D42A27DB-BD31-4B8C-83A1-F6EECF244321}">
-                <p14:modId xmlns:p14="http://schemas.microsoft.com/office/powerpoint/2010/main" val="1628967803"/>
+                <p14:modId xmlns:p14="http://schemas.microsoft.com/office/powerpoint/2010/main" val="724110623"/>
               </p:ext>
             </p:extLst>
           </p:nvPr>
         </p:nvGraphicFramePr>
         <p:xfrm>
-          <a:off x="2416673" y="6096000"/>
-          <a:ext cx="4441327" cy="4112260"/>
+          <a:off x="2438400" y="6553200"/>
+          <a:ext cx="4267200" cy="3731260"/>
         </p:xfrm>
         <a:graphic>
           <a:graphicData uri="http://schemas.openxmlformats.org/drawingml/2006/table">
@@ -2727,7 +2681,7 @@
                 <a:tableStyleId>{2D5ABB26-0587-4C30-8999-92F81FD0307C}</a:tableStyleId>
               </a:tblPr>
               <a:tblGrid>
-                <a:gridCol w="4441327">
+                <a:gridCol w="4267200">
                   <a:extLst>
                     <a:ext uri="{9D8B030D-6E8A-4147-A177-3AD203B41FA5}">
                       <a16:colId xmlns:a16="http://schemas.microsoft.com/office/drawing/2014/main" val="20000"/>
@@ -2735,7 +2689,7 @@
                   </a:extLst>
                 </a:gridCol>
               </a:tblGrid>
-              <a:tr h="3411044">
+              <a:tr h="2774479">
                 <a:tc>
                   <a:txBody>
                     <a:bodyPr/>
@@ -2765,55 +2719,43 @@
                     </a:p>
                     <a:p>
                       <a:pPr lvl="0"/>
-                      <a:endParaRPr lang="en-US" sz="1200" dirty="0" smtClean="0"/>
+                      <a:r>
+                        <a:rPr lang="en-US" sz="1400" b="1" dirty="0" smtClean="0"/>
+                        <a:t>Event Management System</a:t>
+                      </a:r>
+                      <a:r>
+                        <a:rPr lang="en-US" sz="1200" b="1" dirty="0" smtClean="0"/>
+                        <a:t> </a:t>
+                      </a:r>
+                      <a:r>
+                        <a:rPr lang="en-US" sz="1100" dirty="0" smtClean="0"/>
+                        <a:t>May 2024 - October 2024</a:t>
+                      </a:r>
                     </a:p>
                     <a:p>
                       <a:pPr lvl="0"/>
                       <a:r>
-                        <a:rPr lang="en-US" sz="1400" b="1" dirty="0" smtClean="0"/>
-                        <a:t>Event Management System</a:t>
-                      </a:r>
-                      <a:r>
-                        <a:rPr lang="en-US" sz="1200" b="1" dirty="0" smtClean="0"/>
-                        <a:t> </a:t>
-                      </a:r>
-                      <a:r>
-                        <a:rPr lang="en-US" sz="1100" dirty="0" smtClean="0"/>
-                        <a:t>May 2024 - October 2024</a:t>
+                        <a:rPr lang="en-US" sz="1200" dirty="0" smtClean="0"/>
+                        <a:t>Designed UML diagrams, including use case, activity, and sequence diagrams, to map system interactions and workflows effectively.</a:t>
                       </a:r>
                     </a:p>
                     <a:p>
                       <a:pPr lvl="0"/>
                       <a:r>
-                        <a:rPr lang="en-US" sz="1200" dirty="0" smtClean="0"/>
-                        <a:t>Designed UML diagrams, including use case, activity, and sequence diagrams, to map system interactions and workflows effectively.</a:t>
+                        <a:rPr lang="en-US" sz="1400" b="1" dirty="0" smtClean="0"/>
+                        <a:t>Organ Transplant Management System </a:t>
+                      </a:r>
+                      <a:r>
+                        <a:rPr lang="en-US" sz="1100" b="0" dirty="0" smtClean="0"/>
+                        <a:t>May 2024 - August 2024</a:t>
                       </a:r>
                     </a:p>
                     <a:p>
                       <a:pPr lvl="0"/>
-                      <a:endParaRPr lang="en-US" sz="1200" dirty="0" smtClean="0"/>
-                    </a:p>
-                    <a:p>
-                      <a:pPr lvl="0"/>
-                      <a:r>
-                        <a:rPr lang="en-US" sz="1400" b="1" dirty="0" smtClean="0"/>
-                        <a:t>Organ Transplant Management System </a:t>
-                      </a:r>
-                      <a:r>
-                        <a:rPr lang="en-US" sz="1100" b="0" dirty="0" smtClean="0"/>
-                        <a:t>May 2024 - August 2024</a:t>
-                      </a:r>
-                    </a:p>
-                    <a:p>
-                      <a:pPr lvl="0"/>
                       <a:r>
                         <a:rPr lang="en-US" sz="1200" dirty="0" smtClean="0"/>
                         <a:t>Collaborated on a database project using Oracle DBMS, emphasizing data normalization and table creation to ensure efficient database structure.</a:t>
                       </a:r>
-                    </a:p>
-                    <a:p>
-                      <a:pPr lvl="0"/>
-                      <a:endParaRPr lang="en-US" sz="1200" dirty="0" smtClean="0"/>
                     </a:p>
                     <a:p>
                       <a:pPr lvl="0"/>
@@ -2850,7 +2792,7 @@
                   </a:ext>
                 </a:extLst>
               </a:tr>
-              <a:tr h="234232">
+              <a:tr h="212961">
                 <a:tc>
                   <a:txBody>
                     <a:bodyPr/>
@@ -2868,7 +2810,7 @@
                   </a:ext>
                 </a:extLst>
               </a:tr>
-              <a:tr h="234232">
+              <a:tr h="212961">
                 <a:tc>
                   <a:txBody>
                     <a:bodyPr/>
@@ -2974,117 +2916,6 @@
           </a:prstGeom>
         </p:spPr>
       </p:pic>
-      <p:sp>
-        <p:nvSpPr>
-          <p:cNvPr id="16" name="TextBox 15"/>
-          <p:cNvSpPr txBox="1"/>
-          <p:nvPr/>
-        </p:nvSpPr>
-        <p:spPr>
-          <a:xfrm>
-            <a:off x="2331720" y="3694688"/>
-            <a:ext cx="4293379" cy="2123658"/>
-          </a:xfrm>
-          <a:prstGeom prst="rect">
-            <a:avLst/>
-          </a:prstGeom>
-          <a:noFill/>
-        </p:spPr>
-        <p:txBody>
-          <a:bodyPr wrap="square" rtlCol="0">
-            <a:spAutoFit/>
-          </a:bodyPr>
-          <a:lstStyle/>
-          <a:p>
-            <a:r>
-              <a:rPr lang="en-US" sz="1400" b="1" dirty="0" smtClean="0"/>
-              <a:t>Programming </a:t>
-            </a:r>
-            <a:r>
-              <a:rPr lang="en-US" sz="1400" b="1" dirty="0"/>
-              <a:t>Languages</a:t>
-            </a:r>
-            <a:r>
-              <a:rPr lang="en-US" sz="1400" dirty="0"/>
-              <a:t>: </a:t>
-            </a:r>
-            <a:r>
-              <a:rPr lang="en-US" sz="1200" dirty="0"/>
-              <a:t>Python, C, C++, Java, C#</a:t>
-            </a:r>
-          </a:p>
-          <a:p>
-            <a:r>
-              <a:rPr lang="en-US" sz="1400" b="1" dirty="0"/>
-              <a:t>Core Skills</a:t>
-            </a:r>
-            <a:r>
-              <a:rPr lang="en-US" sz="1400" dirty="0"/>
-              <a:t>: </a:t>
-            </a:r>
-            <a:r>
-              <a:rPr lang="en-US" sz="1200" dirty="0"/>
-              <a:t>Data Structures, Algorithms, Problem Solving, Competitive Programming</a:t>
-            </a:r>
-          </a:p>
-          <a:p>
-            <a:r>
-              <a:rPr lang="en-US" sz="1400" b="1" dirty="0"/>
-              <a:t>Frameworks &amp; Tools</a:t>
-            </a:r>
-            <a:r>
-              <a:rPr lang="en-US" sz="1400" dirty="0"/>
-              <a:t>: </a:t>
-            </a:r>
-            <a:r>
-              <a:rPr lang="en-US" sz="1200" dirty="0"/>
-              <a:t>.NET, Cisco Networking, Oracle DBMS, MS Office</a:t>
-            </a:r>
-          </a:p>
-          <a:p>
-            <a:r>
-              <a:rPr lang="en-US" sz="1400" b="1" dirty="0"/>
-              <a:t>Data Analytics</a:t>
-            </a:r>
-            <a:r>
-              <a:rPr lang="en-US" sz="1400" dirty="0"/>
-              <a:t>: </a:t>
-            </a:r>
-            <a:r>
-              <a:rPr lang="en-US" sz="1200" dirty="0"/>
-              <a:t>Data Cleaning, Processing, Visualization</a:t>
-            </a:r>
-          </a:p>
-          <a:p>
-            <a:r>
-              <a:rPr lang="en-US" sz="1400" b="1" dirty="0"/>
-              <a:t>Database Management</a:t>
-            </a:r>
-            <a:r>
-              <a:rPr lang="en-US" sz="1400" dirty="0"/>
-              <a:t>: </a:t>
-            </a:r>
-            <a:r>
-              <a:rPr lang="en-US" sz="1200" dirty="0"/>
-              <a:t>Table Creation, Normalization, ER Diagrams</a:t>
-            </a:r>
-          </a:p>
-          <a:p>
-            <a:r>
-              <a:rPr lang="en-US" sz="1400" b="1" dirty="0"/>
-              <a:t>Project Management</a:t>
-            </a:r>
-            <a:r>
-              <a:rPr lang="en-US" sz="1400" dirty="0"/>
-              <a:t>: </a:t>
-            </a:r>
-            <a:r>
-              <a:rPr lang="en-US" sz="1200" dirty="0"/>
-              <a:t>Software Development, Cross-Functional Collaboration</a:t>
-            </a:r>
-          </a:p>
-        </p:txBody>
-      </p:sp>
       <p:cxnSp>
         <p:nvCxnSpPr>
           <p:cNvPr id="38" name="Straight Connector 37"/>
@@ -3123,14 +2954,14 @@
       </p:cxnSp>
       <p:sp>
         <p:nvSpPr>
-          <p:cNvPr id="40" name="TextBox 39"/>
+          <p:cNvPr id="41" name="TextBox 40"/>
           <p:cNvSpPr txBox="1"/>
           <p:nvPr/>
         </p:nvSpPr>
         <p:spPr>
           <a:xfrm>
-            <a:off x="2331720" y="3434584"/>
-            <a:ext cx="1048993" cy="307777"/>
+            <a:off x="43054" y="7577676"/>
+            <a:ext cx="2014347" cy="2008242"/>
           </a:xfrm>
           <a:prstGeom prst="rect">
             <a:avLst/>
@@ -3143,50 +2974,42 @@
           </a:bodyPr>
           <a:lstStyle/>
           <a:p>
-            <a:pPr marL="12700" algn="just">
-              <a:lnSpc>
-                <a:spcPct val="100000"/>
-              </a:lnSpc>
-              <a:spcBef>
-                <a:spcPts val="204"/>
-              </a:spcBef>
-            </a:pPr>
-            <a:r>
-              <a:rPr lang="en-US" sz="1400" b="1" dirty="0" smtClean="0">
-                <a:solidFill>
-                  <a:srgbClr val="2D74B5"/>
-                </a:solidFill>
-                <a:cs typeface="Calibri"/>
-              </a:rPr>
-              <a:t>Skills</a:t>
-            </a:r>
-            <a:endParaRPr lang="en-US" sz="1400" dirty="0">
-              <a:cs typeface="Calibri"/>
+            <a:r>
+              <a:rPr lang="en-US" sz="1200" dirty="0">
+                <a:solidFill>
+                  <a:schemeClr val="bg1"/>
+                </a:solidFill>
+              </a:rPr>
+              <a:t>ANWARUL KABIR </a:t>
+            </a:r>
+          </a:p>
+          <a:p>
+            <a:r>
+              <a:rPr lang="en-US" sz="1100" dirty="0">
+                <a:solidFill>
+                  <a:schemeClr val="bg1"/>
+                </a:solidFill>
+              </a:rPr>
+              <a:t>ASSOCIATE PROFESSOR, Faculty, DEPARTMENT OF COMPUTER SCIENCE  </a:t>
+            </a:r>
+          </a:p>
+          <a:p>
+            <a:r>
+              <a:rPr lang="en-US" sz="1100" dirty="0">
+                <a:solidFill>
+                  <a:schemeClr val="bg1"/>
+                </a:solidFill>
+              </a:rPr>
+              <a:t>kabir@aiub.edu</a:t>
+            </a:r>
+          </a:p>
+          <a:p>
+            <a:endParaRPr lang="en-US" sz="1200" dirty="0" smtClean="0">
+              <a:solidFill>
+                <a:schemeClr val="bg1"/>
+              </a:solidFill>
             </a:endParaRPr>
           </a:p>
-        </p:txBody>
-      </p:sp>
-      <p:sp>
-        <p:nvSpPr>
-          <p:cNvPr id="41" name="TextBox 40"/>
-          <p:cNvSpPr txBox="1"/>
-          <p:nvPr/>
-        </p:nvSpPr>
-        <p:spPr>
-          <a:xfrm>
-            <a:off x="43054" y="7577676"/>
-            <a:ext cx="2014347" cy="1747244"/>
-          </a:xfrm>
-          <a:prstGeom prst="rect">
-            <a:avLst/>
-          </a:prstGeom>
-          <a:noFill/>
-        </p:spPr>
-        <p:txBody>
-          <a:bodyPr wrap="square" rtlCol="0">
-            <a:spAutoFit/>
-          </a:bodyPr>
-          <a:lstStyle/>
           <a:p>
             <a:r>
               <a:rPr lang="en-US" sz="1200" dirty="0" smtClean="0">
@@ -3242,134 +3065,17 @@
               </a:solidFill>
             </a:endParaRPr>
           </a:p>
-          <a:p>
-            <a:r>
-              <a:rPr lang="en-US" sz="1200" dirty="0" smtClean="0">
-                <a:solidFill>
-                  <a:schemeClr val="bg1"/>
-                </a:solidFill>
-              </a:rPr>
-              <a:t>ANWARUL </a:t>
-            </a:r>
-            <a:r>
-              <a:rPr lang="en-US" sz="1200" dirty="0">
-                <a:solidFill>
-                  <a:schemeClr val="bg1"/>
-                </a:solidFill>
-              </a:rPr>
-              <a:t>KABIR</a:t>
-            </a:r>
-            <a:r>
-              <a:rPr lang="en-US" sz="1050" dirty="0">
-                <a:solidFill>
-                  <a:schemeClr val="bg1"/>
-                </a:solidFill>
-              </a:rPr>
-              <a:t> </a:t>
-            </a:r>
-            <a:endParaRPr lang="en-US" sz="1050" dirty="0" smtClean="0">
-              <a:solidFill>
-                <a:schemeClr val="bg1"/>
-              </a:solidFill>
-            </a:endParaRPr>
-          </a:p>
-          <a:p>
-            <a:r>
-              <a:rPr lang="en-US" sz="1000" dirty="0" smtClean="0">
-                <a:solidFill>
-                  <a:schemeClr val="bg1"/>
-                </a:solidFill>
-              </a:rPr>
-              <a:t>ASSOCIATE </a:t>
-            </a:r>
-            <a:r>
-              <a:rPr lang="en-US" sz="1000" dirty="0">
-                <a:solidFill>
-                  <a:schemeClr val="bg1"/>
-                </a:solidFill>
-              </a:rPr>
-              <a:t>PROFESSOR, </a:t>
-            </a:r>
-            <a:r>
-              <a:rPr lang="en-US" sz="1000" dirty="0" smtClean="0">
-                <a:solidFill>
-                  <a:schemeClr val="bg1"/>
-                </a:solidFill>
-              </a:rPr>
-              <a:t>Faculty, </a:t>
-            </a:r>
-            <a:r>
-              <a:rPr lang="en-US" sz="1000" dirty="0">
-                <a:solidFill>
-                  <a:schemeClr val="bg1"/>
-                </a:solidFill>
-              </a:rPr>
-              <a:t>DEPARTMENT OF COMPUTER SCIENCE  </a:t>
-            </a:r>
-            <a:endParaRPr lang="en-US" sz="1000" dirty="0" smtClean="0">
-              <a:solidFill>
-                <a:schemeClr val="bg1"/>
-              </a:solidFill>
-            </a:endParaRPr>
-          </a:p>
-          <a:p>
-            <a:r>
-              <a:rPr lang="en-US" sz="1000" dirty="0" smtClean="0">
-                <a:solidFill>
-                  <a:schemeClr val="bg1"/>
-                </a:solidFill>
-              </a:rPr>
-              <a:t>kabir@aiub.edu</a:t>
-            </a:r>
-            <a:endParaRPr lang="en-US" sz="1000" dirty="0">
-              <a:solidFill>
-                <a:schemeClr val="bg1"/>
-              </a:solidFill>
-            </a:endParaRPr>
-          </a:p>
-        </p:txBody>
-      </p:sp>
-    </p:spTree>
-  </p:cSld>
-  <p:clrMapOvr>
-    <a:masterClrMapping/>
-  </p:clrMapOvr>
-  <p:timing>
-    <p:tnLst>
-      <p:par>
-        <p:cTn id="1" dur="indefinite" restart="never" nodeType="tmRoot"/>
-      </p:par>
-    </p:tnLst>
-  </p:timing>
-</p:sld>
-</file>
-
-<file path=ppt/slides/slide2.xml><?xml version="1.0" encoding="utf-8"?>
-<p:sld xmlns:a="http://schemas.openxmlformats.org/drawingml/2006/main" xmlns:r="http://schemas.openxmlformats.org/officeDocument/2006/relationships" xmlns:p="http://schemas.openxmlformats.org/presentationml/2006/main" showMasterSp="0">
-  <p:cSld>
-    <p:spTree>
-      <p:nvGrpSpPr>
-        <p:cNvPr id="1" name=""/>
-        <p:cNvGrpSpPr/>
-        <p:nvPr/>
-      </p:nvGrpSpPr>
-      <p:grpSpPr>
-        <a:xfrm>
-          <a:off x="0" y="0"/>
-          <a:ext cx="0" cy="0"/>
-          <a:chOff x="0" y="0"/>
-          <a:chExt cx="0" cy="0"/>
-        </a:xfrm>
-      </p:grpSpPr>
-      <p:sp>
-        <p:nvSpPr>
-          <p:cNvPr id="2" name="object 2"/>
+        </p:txBody>
+      </p:sp>
+      <p:sp>
+        <p:nvSpPr>
+          <p:cNvPr id="26" name="object 2"/>
           <p:cNvSpPr txBox="1"/>
           <p:nvPr/>
         </p:nvSpPr>
         <p:spPr>
           <a:xfrm>
-            <a:off x="457201" y="543439"/>
+            <a:off x="2438400" y="3429000"/>
             <a:ext cx="1814830" cy="239395"/>
           </a:xfrm>
           <a:prstGeom prst="rect">
@@ -3507,158 +3213,23 @@
           </a:p>
         </p:txBody>
       </p:sp>
-      <p:sp>
-        <p:nvSpPr>
-          <p:cNvPr id="6" name="object 6"/>
-          <p:cNvSpPr txBox="1"/>
-          <p:nvPr/>
-        </p:nvSpPr>
-        <p:spPr>
-          <a:xfrm>
-            <a:off x="457201" y="4083511"/>
-            <a:ext cx="5791198" cy="1552348"/>
-          </a:xfrm>
-          <a:prstGeom prst="rect">
-            <a:avLst/>
-          </a:prstGeom>
-        </p:spPr>
-        <p:txBody>
-          <a:bodyPr vert="horz" wrap="square" lIns="0" tIns="13335" rIns="0" bIns="0" rtlCol="0">
-            <a:spAutoFit/>
-          </a:bodyPr>
-          <a:lstStyle/>
-          <a:p>
-            <a:pPr marL="12700">
-              <a:lnSpc>
-                <a:spcPct val="100000"/>
-              </a:lnSpc>
-              <a:spcBef>
-                <a:spcPts val="100"/>
-              </a:spcBef>
-            </a:pPr>
-            <a:r>
-              <a:rPr lang="en-US" sz="1400" b="1" spc="-5" dirty="0" smtClean="0">
-                <a:solidFill>
-                  <a:schemeClr val="accent1">
-                    <a:lumMod val="75000"/>
-                  </a:schemeClr>
-                </a:solidFill>
-                <a:cs typeface="Calibri"/>
-              </a:rPr>
-              <a:t>Soft Skills</a:t>
-            </a:r>
-            <a:endParaRPr lang="en-US" sz="1400" dirty="0">
-              <a:solidFill>
-                <a:schemeClr val="accent1">
-                  <a:lumMod val="75000"/>
-                </a:schemeClr>
-              </a:solidFill>
-              <a:cs typeface="Calibri"/>
-            </a:endParaRPr>
-          </a:p>
-          <a:p>
-            <a:r>
-              <a:rPr lang="en-US" sz="1200" dirty="0" smtClean="0"/>
-              <a:t>Team </a:t>
-            </a:r>
-            <a:r>
-              <a:rPr lang="en-US" sz="1200" dirty="0"/>
-              <a:t>Collaboration</a:t>
-            </a:r>
-          </a:p>
-          <a:p>
-            <a:r>
-              <a:rPr lang="en-US" sz="1200" dirty="0"/>
-              <a:t>Effective Communication</a:t>
-            </a:r>
-          </a:p>
-          <a:p>
-            <a:r>
-              <a:rPr lang="en-US" sz="1200" dirty="0"/>
-              <a:t>Leadership and Mentorship</a:t>
-            </a:r>
-          </a:p>
-          <a:p>
-            <a:r>
-              <a:rPr lang="en-US" sz="1200" dirty="0"/>
-              <a:t>Time </a:t>
-            </a:r>
-            <a:r>
-              <a:rPr lang="en-US" sz="1200" dirty="0" smtClean="0"/>
-              <a:t>Management</a:t>
-            </a:r>
-          </a:p>
-          <a:p>
-            <a:r>
-              <a:rPr lang="en-US" sz="1400" b="1" dirty="0" smtClean="0">
-                <a:solidFill>
-                  <a:schemeClr val="accent1">
-                    <a:lumMod val="75000"/>
-                  </a:schemeClr>
-                </a:solidFill>
-              </a:rPr>
-              <a:t>Specific </a:t>
-            </a:r>
-            <a:r>
-              <a:rPr lang="en-US" sz="1400" b="1" dirty="0">
-                <a:solidFill>
-                  <a:schemeClr val="accent1">
-                    <a:lumMod val="75000"/>
-                  </a:schemeClr>
-                </a:solidFill>
-              </a:rPr>
-              <a:t>Tools and </a:t>
-            </a:r>
-            <a:r>
-              <a:rPr lang="en-US" sz="1400" b="1" dirty="0" smtClean="0">
-                <a:solidFill>
-                  <a:schemeClr val="accent1">
-                    <a:lumMod val="75000"/>
-                  </a:schemeClr>
-                </a:solidFill>
-              </a:rPr>
-              <a:t>Technologies</a:t>
-            </a:r>
-          </a:p>
-          <a:p>
-            <a:r>
-              <a:rPr lang="en-US" sz="1200" dirty="0" smtClean="0"/>
-              <a:t>Git/GitHub </a:t>
-            </a:r>
-          </a:p>
-          <a:p>
-            <a:r>
-              <a:rPr lang="en-US" sz="1200" dirty="0" smtClean="0"/>
-              <a:t>Visual Studio, VS </a:t>
-            </a:r>
-            <a:r>
-              <a:rPr lang="en-US" sz="1200" dirty="0"/>
-              <a:t>Code</a:t>
-            </a:r>
-            <a:r>
-              <a:rPr lang="en-US" sz="1200" dirty="0" smtClean="0"/>
-              <a:t>, CodeBlocks</a:t>
-            </a:r>
-          </a:p>
-        </p:txBody>
-      </p:sp>
       <p:graphicFrame>
         <p:nvGraphicFramePr>
-          <p:cNvPr id="7" name="object 7"/>
+          <p:cNvPr id="28" name="object 7"/>
           <p:cNvGraphicFramePr>
             <a:graphicFrameLocks noGrp="1"/>
           </p:cNvGraphicFramePr>
           <p:nvPr>
             <p:extLst>
               <p:ext uri="{D42A27DB-BD31-4B8C-83A1-F6EECF244321}">
-                <p14:modId xmlns:p14="http://schemas.microsoft.com/office/powerpoint/2010/main" val="4172914592"/>
+                <p14:modId xmlns:p14="http://schemas.microsoft.com/office/powerpoint/2010/main" val="2925152993"/>
               </p:ext>
             </p:extLst>
           </p:nvPr>
         </p:nvGraphicFramePr>
         <p:xfrm>
-          <a:off x="457201" y="922353"/>
-          <a:ext cx="5867400" cy="3121660"/>
+          <a:off x="2362200" y="3657600"/>
+          <a:ext cx="4343400" cy="3083560"/>
         </p:xfrm>
         <a:graphic>
           <a:graphicData uri="http://schemas.openxmlformats.org/drawingml/2006/table">
@@ -3667,7 +3238,7 @@
                 <a:tableStyleId>{2D5ABB26-0587-4C30-8999-92F81FD0307C}</a:tableStyleId>
               </a:tblPr>
               <a:tblGrid>
-                <a:gridCol w="5867400">
+                <a:gridCol w="4343400">
                   <a:extLst>
                     <a:ext uri="{9D8B030D-6E8A-4147-A177-3AD203B41FA5}">
                       <a16:colId xmlns:a16="http://schemas.microsoft.com/office/drawing/2014/main" val="20000"/>
@@ -3675,7 +3246,7 @@
                   </a:extLst>
                 </a:gridCol>
               </a:tblGrid>
-              <a:tr h="2032148">
+              <a:tr h="2030457">
                 <a:tc>
                   <a:txBody>
                     <a:bodyPr/>
@@ -4071,21 +3642,7 @@
                           <a:latin typeface="+mn-lt"/>
                           <a:cs typeface="Calibri"/>
                         </a:rPr>
-                        <a:t> </a:t>
-                      </a:r>
-                      <a:r>
-                        <a:rPr lang="en-US" sz="1250" b="0" spc="-10" baseline="0" dirty="0" err="1" smtClean="0">
-                          <a:latin typeface="+mn-lt"/>
-                          <a:cs typeface="Calibri"/>
-                        </a:rPr>
-                        <a:t>Sripur</a:t>
-                      </a:r>
-                      <a:r>
-                        <a:rPr lang="en-US" sz="1250" b="0" spc="-10" baseline="0" dirty="0" smtClean="0">
-                          <a:latin typeface="+mn-lt"/>
-                          <a:cs typeface="Calibri"/>
-                        </a:rPr>
-                        <a:t> S.C. High School</a:t>
+                        <a:t> Sripur S.C. High School</a:t>
                       </a:r>
                     </a:p>
                     <a:p>
@@ -4152,20 +3709,6 @@
                       </a:r>
                       <a:endParaRPr lang="en-US" sz="1250" dirty="0" smtClean="0">
                         <a:latin typeface="+mn-lt"/>
-                        <a:cs typeface="Calibri"/>
-                      </a:endParaRPr>
-                    </a:p>
-                    <a:p>
-                      <a:pPr marL="90805" marR="406400">
-                        <a:lnSpc>
-                          <a:spcPct val="100000"/>
-                        </a:lnSpc>
-                        <a:spcBef>
-                          <a:spcPts val="285"/>
-                        </a:spcBef>
-                      </a:pPr>
-                      <a:endParaRPr sz="1250" dirty="0">
-                        <a:latin typeface="Calibri"/>
                         <a:cs typeface="Calibri"/>
                       </a:endParaRPr>
                     </a:p>
@@ -4211,7 +3754,7 @@
                   </a:ext>
                 </a:extLst>
               </a:tr>
-              <a:tr h="193100">
+              <a:tr h="196071">
                 <a:tc>
                   <a:txBody>
                     <a:bodyPr/>
@@ -4239,7 +3782,7 @@
                   </a:ext>
                 </a:extLst>
               </a:tr>
-              <a:tr h="193100">
+              <a:tr h="196071">
                 <a:tc>
                   <a:txBody>
                     <a:bodyPr/>
@@ -4271,7 +3814,7 @@
                   </a:ext>
                 </a:extLst>
               </a:tr>
-              <a:tr h="25963">
+              <a:tr h="26362">
                 <a:tc>
                   <a:txBody>
                     <a:bodyPr/>
@@ -4300,7 +3843,7 @@
                   </a:ext>
                 </a:extLst>
               </a:tr>
-              <a:tr h="193100">
+              <a:tr h="196071">
                 <a:tc>
                   <a:txBody>
                     <a:bodyPr/>
@@ -4334,14 +3877,60 @@
       </p:graphicFrame>
       <p:sp>
         <p:nvSpPr>
-          <p:cNvPr id="9" name="object 9"/>
+          <p:cNvPr id="29" name="object 10"/>
+          <p:cNvSpPr txBox="1"/>
+          <p:nvPr/>
+        </p:nvSpPr>
+        <p:spPr>
+          <a:xfrm>
+            <a:off x="2438400" y="6248400"/>
+            <a:ext cx="970280" cy="228909"/>
+          </a:xfrm>
+          <a:prstGeom prst="rect">
+            <a:avLst/>
+          </a:prstGeom>
+        </p:spPr>
+        <p:txBody>
+          <a:bodyPr vert="horz" wrap="square" lIns="0" tIns="13335" rIns="0" bIns="0" rtlCol="0">
+            <a:spAutoFit/>
+          </a:bodyPr>
+          <a:lstStyle/>
+          <a:p>
+            <a:pPr marL="12700">
+              <a:lnSpc>
+                <a:spcPct val="100000"/>
+              </a:lnSpc>
+              <a:spcBef>
+                <a:spcPts val="105"/>
+              </a:spcBef>
+            </a:pPr>
+            <a:r>
+              <a:rPr lang="en-US" sz="1400" b="1" spc="-5" dirty="0" smtClean="0">
+                <a:solidFill>
+                  <a:srgbClr val="2D74B5"/>
+                </a:solidFill>
+                <a:latin typeface="Calibri"/>
+                <a:cs typeface="Calibri"/>
+              </a:rPr>
+              <a:t>Project</a:t>
+            </a:r>
+            <a:endParaRPr sz="1400" dirty="0">
+              <a:latin typeface="Calibri"/>
+              <a:cs typeface="Calibri"/>
+            </a:endParaRPr>
+          </a:p>
+        </p:txBody>
+      </p:sp>
+      <p:sp>
+        <p:nvSpPr>
+          <p:cNvPr id="30" name="object 9"/>
           <p:cNvSpPr/>
           <p:nvPr/>
         </p:nvSpPr>
         <p:spPr>
           <a:xfrm>
-            <a:off x="1749349" y="1649293"/>
-            <a:ext cx="1351915" cy="163195"/>
+            <a:off x="3581401" y="4343400"/>
+            <a:ext cx="1143000" cy="163195"/>
           </a:xfrm>
           <a:custGeom>
             <a:avLst/>
@@ -4384,14 +3973,14 @@
       </p:sp>
       <p:sp>
         <p:nvSpPr>
-          <p:cNvPr id="10" name="object 10"/>
+          <p:cNvPr id="31" name="object 10"/>
           <p:cNvSpPr/>
           <p:nvPr/>
         </p:nvSpPr>
         <p:spPr>
           <a:xfrm>
-            <a:off x="1749349" y="2264168"/>
-            <a:ext cx="1351915" cy="161925"/>
+            <a:off x="3581400" y="5181600"/>
+            <a:ext cx="1371600" cy="161925"/>
           </a:xfrm>
           <a:custGeom>
             <a:avLst/>
@@ -4434,13 +4023,13 @@
       </p:sp>
       <p:sp>
         <p:nvSpPr>
-          <p:cNvPr id="11" name="object 11"/>
+          <p:cNvPr id="32" name="object 11"/>
           <p:cNvSpPr/>
           <p:nvPr/>
         </p:nvSpPr>
         <p:spPr>
           <a:xfrm>
-            <a:off x="1749348" y="2948275"/>
+            <a:off x="3581400" y="5867400"/>
             <a:ext cx="1351915" cy="163195"/>
           </a:xfrm>
           <a:custGeom>
@@ -4482,6 +4071,38 @@
           </a:p>
         </p:txBody>
       </p:sp>
+    </p:spTree>
+  </p:cSld>
+  <p:clrMapOvr>
+    <a:masterClrMapping/>
+  </p:clrMapOvr>
+  <p:timing>
+    <p:tnLst>
+      <p:par>
+        <p:cTn id="1" dur="indefinite" restart="never" nodeType="tmRoot"/>
+      </p:par>
+    </p:tnLst>
+  </p:timing>
+</p:sld>
+</file>
+
+<file path=ppt/slides/slide2.xml><?xml version="1.0" encoding="utf-8"?>
+<p:sld xmlns:a="http://schemas.openxmlformats.org/drawingml/2006/main" xmlns:r="http://schemas.openxmlformats.org/officeDocument/2006/relationships" xmlns:p="http://schemas.openxmlformats.org/presentationml/2006/main" showMasterSp="0">
+  <p:cSld>
+    <p:spTree>
+      <p:nvGrpSpPr>
+        <p:cNvPr id="1" name=""/>
+        <p:cNvGrpSpPr/>
+        <p:nvPr/>
+      </p:nvGrpSpPr>
+      <p:grpSpPr>
+        <a:xfrm>
+          <a:off x="0" y="0"/>
+          <a:ext cx="0" cy="0"/>
+          <a:chOff x="0" y="0"/>
+          <a:chExt cx="0" cy="0"/>
+        </a:xfrm>
+      </p:grpSpPr>
       <p:sp>
         <p:nvSpPr>
           <p:cNvPr id="8" name="object 2"/>
@@ -4490,8 +4111,8 @@
         </p:nvSpPr>
         <p:spPr>
           <a:xfrm>
-            <a:off x="219074" y="5885717"/>
-            <a:ext cx="5991225" cy="230832"/>
+            <a:off x="304800" y="4419600"/>
+            <a:ext cx="5838825" cy="230832"/>
           </a:xfrm>
           <a:prstGeom prst="rect">
             <a:avLst/>
@@ -4567,8 +4188,8 @@
         </p:nvSpPr>
         <p:spPr>
           <a:xfrm>
-            <a:off x="333375" y="6116549"/>
-            <a:ext cx="5653962" cy="2308322"/>
+            <a:off x="381000" y="4724400"/>
+            <a:ext cx="5425362" cy="2308322"/>
           </a:xfrm>
           <a:prstGeom prst="rect">
             <a:avLst/>
@@ -4684,7 +4305,7 @@
         </p:nvSpPr>
         <p:spPr>
           <a:xfrm>
-            <a:off x="333375" y="9067800"/>
+            <a:off x="381000" y="7772400"/>
             <a:ext cx="1524001" cy="584775"/>
           </a:xfrm>
           <a:prstGeom prst="rect">
@@ -4733,7 +4354,7 @@
         </p:blipFill>
         <p:spPr>
           <a:xfrm>
-            <a:off x="314325" y="8811245"/>
+            <a:off x="304800" y="7543800"/>
             <a:ext cx="1226184" cy="339998"/>
           </a:xfrm>
           <a:prstGeom prst="rect">
@@ -4741,6 +4362,214 @@
           </a:prstGeom>
         </p:spPr>
       </p:pic>
+      <p:sp>
+        <p:nvSpPr>
+          <p:cNvPr id="14" name="TextBox 13"/>
+          <p:cNvSpPr txBox="1"/>
+          <p:nvPr/>
+        </p:nvSpPr>
+        <p:spPr>
+          <a:xfrm>
+            <a:off x="457200" y="838200"/>
+            <a:ext cx="1048993" cy="307777"/>
+          </a:xfrm>
+          <a:prstGeom prst="rect">
+            <a:avLst/>
+          </a:prstGeom>
+          <a:noFill/>
+        </p:spPr>
+        <p:txBody>
+          <a:bodyPr wrap="square" rtlCol="0">
+            <a:spAutoFit/>
+          </a:bodyPr>
+          <a:lstStyle/>
+          <a:p>
+            <a:pPr marL="12700" algn="just">
+              <a:lnSpc>
+                <a:spcPct val="100000"/>
+              </a:lnSpc>
+              <a:spcBef>
+                <a:spcPts val="204"/>
+              </a:spcBef>
+            </a:pPr>
+            <a:r>
+              <a:rPr lang="en-US" sz="1400" b="1" dirty="0" smtClean="0">
+                <a:solidFill>
+                  <a:srgbClr val="2D74B5"/>
+                </a:solidFill>
+                <a:cs typeface="Calibri"/>
+              </a:rPr>
+              <a:t>Skills</a:t>
+            </a:r>
+            <a:endParaRPr lang="en-US" sz="1400" dirty="0">
+              <a:cs typeface="Calibri"/>
+            </a:endParaRPr>
+          </a:p>
+        </p:txBody>
+      </p:sp>
+      <p:sp>
+        <p:nvSpPr>
+          <p:cNvPr id="15" name="TextBox 14"/>
+          <p:cNvSpPr txBox="1"/>
+          <p:nvPr/>
+        </p:nvSpPr>
+        <p:spPr>
+          <a:xfrm>
+            <a:off x="457200" y="1143000"/>
+            <a:ext cx="4293379" cy="3293209"/>
+          </a:xfrm>
+          <a:prstGeom prst="rect">
+            <a:avLst/>
+          </a:prstGeom>
+          <a:noFill/>
+        </p:spPr>
+        <p:txBody>
+          <a:bodyPr wrap="square" rtlCol="0">
+            <a:spAutoFit/>
+          </a:bodyPr>
+          <a:lstStyle/>
+          <a:p>
+            <a:r>
+              <a:rPr lang="en-US" sz="1400" b="1" dirty="0" smtClean="0"/>
+              <a:t>Programming </a:t>
+            </a:r>
+            <a:r>
+              <a:rPr lang="en-US" sz="1400" b="1" dirty="0"/>
+              <a:t>Languages</a:t>
+            </a:r>
+            <a:r>
+              <a:rPr lang="en-US" sz="1400" dirty="0"/>
+              <a:t>: </a:t>
+            </a:r>
+            <a:r>
+              <a:rPr lang="en-US" sz="1200" dirty="0"/>
+              <a:t>Python, C, C++, Java, C#</a:t>
+            </a:r>
+          </a:p>
+          <a:p>
+            <a:r>
+              <a:rPr lang="en-US" sz="1400" b="1" dirty="0"/>
+              <a:t>Core Skills</a:t>
+            </a:r>
+            <a:r>
+              <a:rPr lang="en-US" sz="1400" dirty="0"/>
+              <a:t>: </a:t>
+            </a:r>
+            <a:r>
+              <a:rPr lang="en-US" sz="1200" dirty="0"/>
+              <a:t>Data Structures, Algorithms, Problem Solving, Competitive Programming</a:t>
+            </a:r>
+          </a:p>
+          <a:p>
+            <a:r>
+              <a:rPr lang="en-US" sz="1400" b="1" dirty="0"/>
+              <a:t>Frameworks &amp; Tools</a:t>
+            </a:r>
+            <a:r>
+              <a:rPr lang="en-US" sz="1400" dirty="0"/>
+              <a:t>: </a:t>
+            </a:r>
+            <a:r>
+              <a:rPr lang="en-US" sz="1200" dirty="0"/>
+              <a:t>.NET, Cisco Networking, Oracle DBMS, MS Office</a:t>
+            </a:r>
+          </a:p>
+          <a:p>
+            <a:r>
+              <a:rPr lang="en-US" sz="1400" b="1" dirty="0"/>
+              <a:t>Data Analytics</a:t>
+            </a:r>
+            <a:r>
+              <a:rPr lang="en-US" sz="1400" dirty="0"/>
+              <a:t>: </a:t>
+            </a:r>
+            <a:r>
+              <a:rPr lang="en-US" sz="1200" dirty="0"/>
+              <a:t>Data Cleaning, Processing, Visualization</a:t>
+            </a:r>
+          </a:p>
+          <a:p>
+            <a:r>
+              <a:rPr lang="en-US" sz="1400" b="1" dirty="0"/>
+              <a:t>Database Management</a:t>
+            </a:r>
+            <a:r>
+              <a:rPr lang="en-US" sz="1400" dirty="0"/>
+              <a:t>: </a:t>
+            </a:r>
+            <a:r>
+              <a:rPr lang="en-US" sz="1200" dirty="0"/>
+              <a:t>Table Creation, Normalization, ER Diagrams</a:t>
+            </a:r>
+          </a:p>
+          <a:p>
+            <a:r>
+              <a:rPr lang="en-US" sz="1400" b="1" dirty="0"/>
+              <a:t>Project Management</a:t>
+            </a:r>
+            <a:r>
+              <a:rPr lang="en-US" sz="1400" dirty="0"/>
+              <a:t>: </a:t>
+            </a:r>
+            <a:r>
+              <a:rPr lang="en-US" sz="1200" dirty="0"/>
+              <a:t>Software Development, Cross-Functional </a:t>
+            </a:r>
+            <a:r>
+              <a:rPr lang="en-US" sz="1200" dirty="0" smtClean="0"/>
+              <a:t>Collaboration</a:t>
+            </a:r>
+          </a:p>
+          <a:p>
+            <a:r>
+              <a:rPr lang="en-US" sz="1400" b="1" dirty="0"/>
+              <a:t>Organizational Effectiveness</a:t>
+            </a:r>
+          </a:p>
+          <a:p>
+            <a:r>
+              <a:rPr lang="en-US" sz="1200" dirty="0"/>
+              <a:t>Team </a:t>
+            </a:r>
+            <a:r>
+              <a:rPr lang="en-US" sz="1200" dirty="0" smtClean="0"/>
+              <a:t>Collaboration, Effective Communication, Leadership </a:t>
+            </a:r>
+            <a:r>
+              <a:rPr lang="en-US" sz="1200" dirty="0"/>
+              <a:t>and </a:t>
+            </a:r>
+            <a:r>
+              <a:rPr lang="en-US" sz="1200" dirty="0" smtClean="0"/>
+              <a:t>Mentorship, Time Management.</a:t>
+            </a:r>
+            <a:endParaRPr lang="en-US" sz="1200" dirty="0"/>
+          </a:p>
+          <a:p>
+            <a:r>
+              <a:rPr lang="en-US" sz="1400" b="1" dirty="0"/>
+              <a:t>Specific Tools and Technologies</a:t>
+            </a:r>
+          </a:p>
+          <a:p>
+            <a:r>
+              <a:rPr lang="en-US" sz="1200" dirty="0"/>
+              <a:t>Git/GitHub </a:t>
+            </a:r>
+            <a:r>
+              <a:rPr lang="en-US" sz="1200" dirty="0" smtClean="0"/>
+              <a:t>, Visual </a:t>
+            </a:r>
+            <a:r>
+              <a:rPr lang="en-US" sz="1200" dirty="0"/>
+              <a:t>Studio, VS Code, CodeBlocks</a:t>
+            </a:r>
+          </a:p>
+          <a:p>
+            <a:endParaRPr lang="en-US" sz="1200" dirty="0"/>
+          </a:p>
+        </p:txBody>
+      </p:sp>
     </p:spTree>
   </p:cSld>
   <p:clrMapOvr>

</xml_diff>